<commit_message>
added key to chart
</commit_message>
<xml_diff>
--- a/Documentation/abstract sim draw.pptx
+++ b/Documentation/abstract sim draw.pptx
@@ -3538,14 +3538,14 @@
             <a:pPr algn="ctr"/>
             <a:r>
               <a:rPr lang="en-US" sz="1400" dirty="0"/>
-              <a:t>Concert implementation of Peer</a:t>
+              <a:t>Concrete implementation of Peer</a:t>
             </a:r>
           </a:p>
           <a:p>
             <a:pPr algn="ctr"/>
             <a:r>
               <a:rPr lang="en-US" sz="1400" dirty="0"/>
-              <a:t>&lt;User defined peer function&gt;</a:t>
+              <a:t>&lt;User defined peer&gt;</a:t>
             </a:r>
           </a:p>
         </p:txBody>
@@ -4082,6 +4082,11 @@
             <a:avLst/>
           </a:prstGeom>
           <a:noFill/>
+          <a:ln w="50800">
+            <a:solidFill>
+              <a:schemeClr val="tx1"/>
+            </a:solidFill>
+          </a:ln>
         </p:spPr>
         <p:txBody>
           <a:bodyPr wrap="square" rtlCol="0">
@@ -4153,6 +4158,11 @@
             <a:avLst/>
           </a:prstGeom>
           <a:noFill/>
+          <a:ln w="50800">
+            <a:solidFill>
+              <a:schemeClr val="tx1"/>
+            </a:solidFill>
+          </a:ln>
         </p:spPr>
         <p:txBody>
           <a:bodyPr wrap="square">
@@ -4226,6 +4236,11 @@
             <a:avLst/>
           </a:prstGeom>
           <a:noFill/>
+          <a:ln w="50800">
+            <a:solidFill>
+              <a:schemeClr val="tx1"/>
+            </a:solidFill>
+          </a:ln>
         </p:spPr>
         <p:txBody>
           <a:bodyPr wrap="square">
@@ -4291,6 +4306,11 @@
             <a:avLst/>
           </a:prstGeom>
           <a:noFill/>
+          <a:ln w="50800">
+            <a:solidFill>
+              <a:schemeClr val="tx1"/>
+            </a:solidFill>
+          </a:ln>
         </p:spPr>
         <p:txBody>
           <a:bodyPr wrap="square">
@@ -4348,6 +4368,11 @@
             <a:avLst/>
           </a:prstGeom>
           <a:noFill/>
+          <a:ln w="50800">
+            <a:solidFill>
+              <a:schemeClr val="tx1"/>
+            </a:solidFill>
+          </a:ln>
         </p:spPr>
         <p:txBody>
           <a:bodyPr wrap="square">
@@ -4365,6 +4390,348 @@
             <a:r>
               <a:rPr lang="en-US" sz="1000" dirty="0"/>
               <a:t>This class handles reading in a configuration file, setting up log files for the simulation, initializing the network class, and repeating a simulation according to the configuration file (i.e., running multiple experiments with the same configuration).  It is templated with a user defined message and peer class, used for the underlaying network instance. </a:t>
+            </a:r>
+          </a:p>
+        </p:txBody>
+      </p:sp>
+      <p:sp>
+        <p:nvSpPr>
+          <p:cNvPr id="45" name="Rounded Rectangle 44">
+            <a:extLst>
+              <a:ext uri="{FF2B5EF4-FFF2-40B4-BE49-F238E27FC236}">
+                <a16:creationId xmlns:a16="http://schemas.microsoft.com/office/drawing/2014/main" id="{75621E2A-6D9C-AD52-FC5D-C90082904A85}"/>
+              </a:ext>
+            </a:extLst>
+          </p:cNvPr>
+          <p:cNvSpPr/>
+          <p:nvPr/>
+        </p:nvSpPr>
+        <p:spPr>
+          <a:xfrm>
+            <a:off x="11291994" y="63802"/>
+            <a:ext cx="246953" cy="246748"/>
+          </a:xfrm>
+          <a:prstGeom prst="roundRect">
+            <a:avLst/>
+          </a:prstGeom>
+        </p:spPr>
+        <p:style>
+          <a:lnRef idx="2">
+            <a:schemeClr val="accent1">
+              <a:shade val="50000"/>
+            </a:schemeClr>
+          </a:lnRef>
+          <a:fillRef idx="1">
+            <a:schemeClr val="accent1"/>
+          </a:fillRef>
+          <a:effectRef idx="0">
+            <a:schemeClr val="accent1"/>
+          </a:effectRef>
+          <a:fontRef idx="minor">
+            <a:schemeClr val="lt1"/>
+          </a:fontRef>
+        </p:style>
+        <p:txBody>
+          <a:bodyPr rtlCol="0" anchor="ctr"/>
+          <a:lstStyle/>
+          <a:p>
+            <a:pPr algn="ctr"/>
+            <a:endParaRPr lang="en-US" sz="1400" dirty="0"/>
+          </a:p>
+        </p:txBody>
+      </p:sp>
+      <p:sp>
+        <p:nvSpPr>
+          <p:cNvPr id="46" name="Rounded Rectangle 45">
+            <a:extLst>
+              <a:ext uri="{FF2B5EF4-FFF2-40B4-BE49-F238E27FC236}">
+                <a16:creationId xmlns:a16="http://schemas.microsoft.com/office/drawing/2014/main" id="{33E0C98B-5E6D-2701-2F4F-547CF6CA173F}"/>
+              </a:ext>
+            </a:extLst>
+          </p:cNvPr>
+          <p:cNvSpPr/>
+          <p:nvPr/>
+        </p:nvSpPr>
+        <p:spPr>
+          <a:xfrm>
+            <a:off x="11288471" y="409999"/>
+            <a:ext cx="246953" cy="246721"/>
+          </a:xfrm>
+          <a:prstGeom prst="roundRect">
+            <a:avLst/>
+          </a:prstGeom>
+          <a:solidFill>
+            <a:schemeClr val="accent6">
+              <a:lumMod val="75000"/>
+            </a:schemeClr>
+          </a:solidFill>
+        </p:spPr>
+        <p:style>
+          <a:lnRef idx="2">
+            <a:schemeClr val="accent1">
+              <a:shade val="50000"/>
+            </a:schemeClr>
+          </a:lnRef>
+          <a:fillRef idx="1">
+            <a:schemeClr val="accent1"/>
+          </a:fillRef>
+          <a:effectRef idx="0">
+            <a:schemeClr val="accent1"/>
+          </a:effectRef>
+          <a:fontRef idx="minor">
+            <a:schemeClr val="lt1"/>
+          </a:fontRef>
+        </p:style>
+        <p:txBody>
+          <a:bodyPr rtlCol="0" anchor="ctr"/>
+          <a:lstStyle/>
+          <a:p>
+            <a:pPr algn="ctr"/>
+            <a:endParaRPr lang="en-US" sz="1400" dirty="0"/>
+          </a:p>
+        </p:txBody>
+      </p:sp>
+      <p:sp>
+        <p:nvSpPr>
+          <p:cNvPr id="47" name="TextBox 46">
+            <a:extLst>
+              <a:ext uri="{FF2B5EF4-FFF2-40B4-BE49-F238E27FC236}">
+                <a16:creationId xmlns:a16="http://schemas.microsoft.com/office/drawing/2014/main" id="{8E2251D4-E0B6-3526-33B7-33508FFBAE60}"/>
+              </a:ext>
+            </a:extLst>
+          </p:cNvPr>
+          <p:cNvSpPr txBox="1"/>
+          <p:nvPr/>
+        </p:nvSpPr>
+        <p:spPr>
+          <a:xfrm>
+            <a:off x="10253957" y="394859"/>
+            <a:ext cx="1034514" cy="276999"/>
+          </a:xfrm>
+          <a:prstGeom prst="rect">
+            <a:avLst/>
+          </a:prstGeom>
+          <a:noFill/>
+        </p:spPr>
+        <p:txBody>
+          <a:bodyPr wrap="none" rtlCol="0">
+            <a:spAutoFit/>
+          </a:bodyPr>
+          <a:lstStyle/>
+          <a:p>
+            <a:r>
+              <a:rPr lang="en-US" sz="1200" dirty="0"/>
+              <a:t>User Defined </a:t>
+            </a:r>
+          </a:p>
+        </p:txBody>
+      </p:sp>
+      <p:sp>
+        <p:nvSpPr>
+          <p:cNvPr id="48" name="TextBox 47">
+            <a:extLst>
+              <a:ext uri="{FF2B5EF4-FFF2-40B4-BE49-F238E27FC236}">
+                <a16:creationId xmlns:a16="http://schemas.microsoft.com/office/drawing/2014/main" id="{FCCE83D0-734B-C14F-36F4-87C727C82FE7}"/>
+              </a:ext>
+            </a:extLst>
+          </p:cNvPr>
+          <p:cNvSpPr txBox="1"/>
+          <p:nvPr/>
+        </p:nvSpPr>
+        <p:spPr>
+          <a:xfrm>
+            <a:off x="10098722" y="75705"/>
+            <a:ext cx="1189749" cy="276999"/>
+          </a:xfrm>
+          <a:prstGeom prst="rect">
+            <a:avLst/>
+          </a:prstGeom>
+          <a:noFill/>
+        </p:spPr>
+        <p:txBody>
+          <a:bodyPr wrap="none" rtlCol="0">
+            <a:spAutoFit/>
+          </a:bodyPr>
+          <a:lstStyle/>
+          <a:p>
+            <a:r>
+              <a:rPr lang="en-US" sz="1200" dirty="0"/>
+              <a:t>System Defined </a:t>
+            </a:r>
+          </a:p>
+        </p:txBody>
+      </p:sp>
+      <p:sp>
+        <p:nvSpPr>
+          <p:cNvPr id="49" name="Rounded Rectangle 48">
+            <a:extLst>
+              <a:ext uri="{FF2B5EF4-FFF2-40B4-BE49-F238E27FC236}">
+                <a16:creationId xmlns:a16="http://schemas.microsoft.com/office/drawing/2014/main" id="{7CCAB185-908F-62BE-912B-91E2B57320CD}"/>
+              </a:ext>
+            </a:extLst>
+          </p:cNvPr>
+          <p:cNvSpPr/>
+          <p:nvPr/>
+        </p:nvSpPr>
+        <p:spPr>
+          <a:xfrm>
+            <a:off x="9100427" y="187176"/>
+            <a:ext cx="320692" cy="302200"/>
+          </a:xfrm>
+          <a:prstGeom prst="roundRect">
+            <a:avLst/>
+          </a:prstGeom>
+        </p:spPr>
+        <p:style>
+          <a:lnRef idx="2">
+            <a:schemeClr val="accent1">
+              <a:shade val="50000"/>
+            </a:schemeClr>
+          </a:lnRef>
+          <a:fillRef idx="1">
+            <a:schemeClr val="accent1"/>
+          </a:fillRef>
+          <a:effectRef idx="0">
+            <a:schemeClr val="accent1"/>
+          </a:effectRef>
+          <a:fontRef idx="minor">
+            <a:schemeClr val="lt1"/>
+          </a:fontRef>
+        </p:style>
+        <p:txBody>
+          <a:bodyPr rtlCol="0" anchor="ctr"/>
+          <a:lstStyle/>
+          <a:p>
+            <a:pPr algn="ctr"/>
+            <a:r>
+              <a:rPr lang="en-US" sz="1400" dirty="0"/>
+              <a:t>X</a:t>
+            </a:r>
+          </a:p>
+        </p:txBody>
+      </p:sp>
+      <p:sp>
+        <p:nvSpPr>
+          <p:cNvPr id="50" name="Rounded Rectangle 49">
+            <a:extLst>
+              <a:ext uri="{FF2B5EF4-FFF2-40B4-BE49-F238E27FC236}">
+                <a16:creationId xmlns:a16="http://schemas.microsoft.com/office/drawing/2014/main" id="{1176E053-E8EA-2532-5AD3-C285C338FE4B}"/>
+              </a:ext>
+            </a:extLst>
+          </p:cNvPr>
+          <p:cNvSpPr/>
+          <p:nvPr/>
+        </p:nvSpPr>
+        <p:spPr>
+          <a:xfrm>
+            <a:off x="6996212" y="187176"/>
+            <a:ext cx="320692" cy="302200"/>
+          </a:xfrm>
+          <a:prstGeom prst="roundRect">
+            <a:avLst/>
+          </a:prstGeom>
+        </p:spPr>
+        <p:style>
+          <a:lnRef idx="2">
+            <a:schemeClr val="accent1">
+              <a:shade val="50000"/>
+            </a:schemeClr>
+          </a:lnRef>
+          <a:fillRef idx="1">
+            <a:schemeClr val="accent1"/>
+          </a:fillRef>
+          <a:effectRef idx="0">
+            <a:schemeClr val="accent1"/>
+          </a:effectRef>
+          <a:fontRef idx="minor">
+            <a:schemeClr val="lt1"/>
+          </a:fontRef>
+        </p:style>
+        <p:txBody>
+          <a:bodyPr rtlCol="0" anchor="ctr"/>
+          <a:lstStyle/>
+          <a:p>
+            <a:pPr algn="ctr"/>
+            <a:r>
+              <a:rPr lang="en-US" sz="1400" dirty="0"/>
+              <a:t>Y</a:t>
+            </a:r>
+          </a:p>
+        </p:txBody>
+      </p:sp>
+      <p:cxnSp>
+        <p:nvCxnSpPr>
+          <p:cNvPr id="51" name="Straight Arrow Connector 50">
+            <a:extLst>
+              <a:ext uri="{FF2B5EF4-FFF2-40B4-BE49-F238E27FC236}">
+                <a16:creationId xmlns:a16="http://schemas.microsoft.com/office/drawing/2014/main" id="{CD5921DC-D799-9E3C-B8DF-2ED868463405}"/>
+              </a:ext>
+            </a:extLst>
+          </p:cNvPr>
+          <p:cNvCxnSpPr>
+            <a:cxnSpLocks/>
+            <a:endCxn id="49" idx="1"/>
+          </p:cNvCxnSpPr>
+          <p:nvPr/>
+        </p:nvCxnSpPr>
+        <p:spPr>
+          <a:xfrm flipV="1">
+            <a:off x="7316904" y="338276"/>
+            <a:ext cx="1783523" cy="9555"/>
+          </a:xfrm>
+          <a:prstGeom prst="straightConnector1">
+            <a:avLst/>
+          </a:prstGeom>
+          <a:ln w="50800">
+            <a:tailEnd type="triangle"/>
+          </a:ln>
+        </p:spPr>
+        <p:style>
+          <a:lnRef idx="1">
+            <a:schemeClr val="accent1"/>
+          </a:lnRef>
+          <a:fillRef idx="0">
+            <a:schemeClr val="accent1"/>
+          </a:fillRef>
+          <a:effectRef idx="0">
+            <a:schemeClr val="accent1"/>
+          </a:effectRef>
+          <a:fontRef idx="minor">
+            <a:schemeClr val="tx1"/>
+          </a:fontRef>
+        </p:style>
+      </p:cxnSp>
+      <p:sp>
+        <p:nvSpPr>
+          <p:cNvPr id="53" name="TextBox 52">
+            <a:extLst>
+              <a:ext uri="{FF2B5EF4-FFF2-40B4-BE49-F238E27FC236}">
+                <a16:creationId xmlns:a16="http://schemas.microsoft.com/office/drawing/2014/main" id="{C89B5039-8042-F53B-1645-17E5DCD346DB}"/>
+              </a:ext>
+            </a:extLst>
+          </p:cNvPr>
+          <p:cNvSpPr txBox="1"/>
+          <p:nvPr/>
+        </p:nvSpPr>
+        <p:spPr>
+          <a:xfrm>
+            <a:off x="7494591" y="75705"/>
+            <a:ext cx="1428148" cy="276999"/>
+          </a:xfrm>
+          <a:prstGeom prst="rect">
+            <a:avLst/>
+          </a:prstGeom>
+          <a:noFill/>
+        </p:spPr>
+        <p:txBody>
+          <a:bodyPr wrap="none" rtlCol="0">
+            <a:spAutoFit/>
+          </a:bodyPr>
+          <a:lstStyle/>
+          <a:p>
+            <a:r>
+              <a:rPr lang="en-US" sz="1200" dirty="0"/>
+              <a:t>X relies on or uses Y</a:t>
             </a:r>
           </a:p>
         </p:txBody>

</xml_diff>